<commit_message>
Fixed presentation, added speach
</commit_message>
<xml_diff>
--- a/Презентация.pptx
+++ b/Презентация.pptx
@@ -1,6 +1,6 @@
 
 <file path=ppt/presentation.xml><?xml version="1.0" encoding="utf-8"?>
-<p:presentation xmlns:a="http://schemas.openxmlformats.org/drawingml/2006/main" xmlns:r="http://schemas.openxmlformats.org/officeDocument/2006/relationships" xmlns:p="http://schemas.openxmlformats.org/presentationml/2006/main" showSpecialPlsOnTitleSld="0" saveSubsetFonts="1">
+<p:presentation xmlns:a="http://schemas.openxmlformats.org/drawingml/2006/main" xmlns:r="http://schemas.openxmlformats.org/officeDocument/2006/relationships" xmlns:p="http://schemas.openxmlformats.org/presentationml/2006/main" saveSubsetFonts="1">
   <p:sldMasterIdLst>
     <p:sldMasterId id="2147483648" r:id="rId1"/>
   </p:sldMasterIdLst>
@@ -3627,7 +3627,7 @@
         <p:spPr>
           <a:xfrm>
             <a:off x="107504" y="116632"/>
-            <a:ext cx="9036496" cy="6740307"/>
+            <a:ext cx="8928992" cy="6463308"/>
           </a:xfrm>
           <a:prstGeom prst="rect">
             <a:avLst/>
@@ -3642,193 +3642,322 @@
           <a:p>
             <a:pPr algn="ctr"/>
             <a:r>
-              <a:rPr lang="ru-RU" dirty="0" smtClean="0"/>
+              <a:rPr lang="ru-RU" dirty="0" smtClean="0">
+                <a:latin typeface="Times New Roman" pitchFamily="18" charset="0"/>
+                <a:cs typeface="Times New Roman" pitchFamily="18" charset="0"/>
+              </a:rPr>
               <a:t>Министерство науки и высшего образования Российской Федерации</a:t>
             </a:r>
           </a:p>
           <a:p>
             <a:pPr algn="ctr"/>
             <a:r>
-              <a:rPr lang="ru-RU" dirty="0" smtClean="0"/>
+              <a:rPr lang="ru-RU" dirty="0" smtClean="0">
+                <a:latin typeface="Times New Roman" pitchFamily="18" charset="0"/>
+                <a:cs typeface="Times New Roman" pitchFamily="18" charset="0"/>
+              </a:rPr>
               <a:t>Федеральное государственное автономное образовательное учреждение</a:t>
             </a:r>
           </a:p>
           <a:p>
             <a:pPr algn="ctr"/>
             <a:r>
-              <a:rPr lang="ru-RU" dirty="0" smtClean="0"/>
+              <a:rPr lang="ru-RU" dirty="0" smtClean="0">
+                <a:latin typeface="Times New Roman" pitchFamily="18" charset="0"/>
+                <a:cs typeface="Times New Roman" pitchFamily="18" charset="0"/>
+              </a:rPr>
               <a:t>высшего образования</a:t>
             </a:r>
           </a:p>
           <a:p>
             <a:pPr algn="ctr"/>
             <a:r>
-              <a:rPr lang="ru-RU" dirty="0" smtClean="0"/>
+              <a:rPr lang="ru-RU" dirty="0" smtClean="0">
+                <a:latin typeface="Times New Roman" pitchFamily="18" charset="0"/>
+                <a:cs typeface="Times New Roman" pitchFamily="18" charset="0"/>
+              </a:rPr>
               <a:t>«Южно-Уральский государственный университет</a:t>
             </a:r>
           </a:p>
           <a:p>
             <a:pPr algn="ctr"/>
             <a:r>
-              <a:rPr lang="ru-RU" dirty="0" smtClean="0"/>
+              <a:rPr lang="ru-RU" dirty="0" smtClean="0">
+                <a:latin typeface="Times New Roman" pitchFamily="18" charset="0"/>
+                <a:cs typeface="Times New Roman" pitchFamily="18" charset="0"/>
+              </a:rPr>
               <a:t>(национальный исследовательский университет)»</a:t>
             </a:r>
           </a:p>
           <a:p>
             <a:pPr algn="ctr"/>
             <a:r>
-              <a:rPr lang="ru-RU" dirty="0" smtClean="0"/>
+              <a:rPr lang="ru-RU" dirty="0" smtClean="0">
+                <a:latin typeface="Times New Roman" pitchFamily="18" charset="0"/>
+                <a:cs typeface="Times New Roman" pitchFamily="18" charset="0"/>
+              </a:rPr>
               <a:t>Институт естественных и точных наук</a:t>
             </a:r>
           </a:p>
           <a:p>
             <a:pPr algn="ctr"/>
             <a:r>
-              <a:rPr lang="ru-RU" dirty="0" smtClean="0"/>
+              <a:rPr lang="ru-RU" dirty="0" smtClean="0">
+                <a:latin typeface="Times New Roman" pitchFamily="18" charset="0"/>
+                <a:cs typeface="Times New Roman" pitchFamily="18" charset="0"/>
+              </a:rPr>
               <a:t>Кафедра математического и компьютерного моделирования</a:t>
             </a:r>
-            <a:endParaRPr lang="en-US" dirty="0" smtClean="0"/>
+            <a:endParaRPr lang="en-US" dirty="0" smtClean="0">
+              <a:latin typeface="Times New Roman" pitchFamily="18" charset="0"/>
+              <a:cs typeface="Times New Roman" pitchFamily="18" charset="0"/>
+            </a:endParaRPr>
           </a:p>
           <a:p>
             <a:pPr algn="ctr"/>
-            <a:endParaRPr lang="en-US" dirty="0"/>
+            <a:endParaRPr lang="en-US" dirty="0">
+              <a:latin typeface="Times New Roman" pitchFamily="18" charset="0"/>
+              <a:cs typeface="Times New Roman" pitchFamily="18" charset="0"/>
+            </a:endParaRPr>
           </a:p>
           <a:p>
             <a:pPr algn="ctr"/>
-            <a:endParaRPr lang="en-US" dirty="0" smtClean="0"/>
+            <a:endParaRPr lang="en-US" dirty="0" smtClean="0">
+              <a:latin typeface="Times New Roman" pitchFamily="18" charset="0"/>
+              <a:cs typeface="Times New Roman" pitchFamily="18" charset="0"/>
+            </a:endParaRPr>
           </a:p>
           <a:p>
             <a:pPr algn="ctr"/>
             <a:r>
-              <a:rPr lang="ru-RU" b="1" dirty="0" smtClean="0"/>
+              <a:rPr lang="ru-RU" b="1" dirty="0" smtClean="0">
+                <a:latin typeface="Times New Roman" pitchFamily="18" charset="0"/>
+                <a:cs typeface="Times New Roman" pitchFamily="18" charset="0"/>
+              </a:rPr>
               <a:t>Выпускная квалификационная работа</a:t>
             </a:r>
           </a:p>
           <a:p>
             <a:pPr algn="ctr"/>
             <a:r>
-              <a:rPr lang="ru-RU" dirty="0" smtClean="0"/>
+              <a:rPr lang="ru-RU" dirty="0" smtClean="0">
+                <a:latin typeface="Times New Roman" pitchFamily="18" charset="0"/>
+                <a:cs typeface="Times New Roman" pitchFamily="18" charset="0"/>
+              </a:rPr>
               <a:t>На тему: «Анализ и прогнозирование динамики цен акций </a:t>
             </a:r>
             <a:r>
-              <a:rPr lang="en-US" dirty="0" smtClean="0"/>
+              <a:rPr lang="en-US" dirty="0" smtClean="0">
+                <a:latin typeface="Times New Roman" pitchFamily="18" charset="0"/>
+                <a:cs typeface="Times New Roman" pitchFamily="18" charset="0"/>
+              </a:rPr>
               <a:t>“</a:t>
             </a:r>
             <a:r>
-              <a:rPr lang="ru-RU" dirty="0" err="1" smtClean="0"/>
+              <a:rPr lang="ru-RU" dirty="0" err="1" smtClean="0">
+                <a:latin typeface="Times New Roman" pitchFamily="18" charset="0"/>
+                <a:cs typeface="Times New Roman" pitchFamily="18" charset="0"/>
+              </a:rPr>
               <a:t>Samsung</a:t>
             </a:r>
             <a:r>
-              <a:rPr lang="ru-RU" dirty="0" smtClean="0"/>
+              <a:rPr lang="ru-RU" dirty="0" smtClean="0">
+                <a:latin typeface="Times New Roman" pitchFamily="18" charset="0"/>
+                <a:cs typeface="Times New Roman" pitchFamily="18" charset="0"/>
+              </a:rPr>
               <a:t> </a:t>
             </a:r>
             <a:r>
-              <a:rPr lang="ru-RU" dirty="0" err="1" smtClean="0"/>
+              <a:rPr lang="ru-RU" dirty="0" err="1" smtClean="0">
+                <a:latin typeface="Times New Roman" pitchFamily="18" charset="0"/>
+                <a:cs typeface="Times New Roman" pitchFamily="18" charset="0"/>
+              </a:rPr>
               <a:t>Electronics</a:t>
             </a:r>
             <a:r>
-              <a:rPr lang="ru-RU" dirty="0" smtClean="0"/>
+              <a:rPr lang="ru-RU" dirty="0" smtClean="0">
+                <a:latin typeface="Times New Roman" pitchFamily="18" charset="0"/>
+                <a:cs typeface="Times New Roman" pitchFamily="18" charset="0"/>
+              </a:rPr>
               <a:t> </a:t>
             </a:r>
             <a:r>
-              <a:rPr lang="ru-RU" dirty="0" err="1" smtClean="0"/>
+              <a:rPr lang="ru-RU" dirty="0" err="1" smtClean="0">
+                <a:latin typeface="Times New Roman" pitchFamily="18" charset="0"/>
+                <a:cs typeface="Times New Roman" pitchFamily="18" charset="0"/>
+              </a:rPr>
               <a:t>Co</a:t>
             </a:r>
             <a:r>
-              <a:rPr lang="ru-RU" dirty="0" smtClean="0"/>
+              <a:rPr lang="ru-RU" dirty="0" smtClean="0">
+                <a:latin typeface="Times New Roman" pitchFamily="18" charset="0"/>
+                <a:cs typeface="Times New Roman" pitchFamily="18" charset="0"/>
+              </a:rPr>
               <a:t>.</a:t>
             </a:r>
             <a:r>
-              <a:rPr lang="en-US" dirty="0" smtClean="0"/>
+              <a:rPr lang="en-US" dirty="0" smtClean="0">
+                <a:latin typeface="Times New Roman" pitchFamily="18" charset="0"/>
+                <a:cs typeface="Times New Roman" pitchFamily="18" charset="0"/>
+              </a:rPr>
               <a:t>”</a:t>
             </a:r>
             <a:r>
-              <a:rPr lang="ru-RU" dirty="0" smtClean="0"/>
+              <a:rPr lang="ru-RU" dirty="0" smtClean="0">
+                <a:latin typeface="Times New Roman" pitchFamily="18" charset="0"/>
+                <a:cs typeface="Times New Roman" pitchFamily="18" charset="0"/>
+              </a:rPr>
               <a:t>»</a:t>
             </a:r>
-            <a:endParaRPr lang="en-US" dirty="0" smtClean="0"/>
+            <a:endParaRPr lang="en-US" dirty="0" smtClean="0">
+              <a:latin typeface="Times New Roman" pitchFamily="18" charset="0"/>
+              <a:cs typeface="Times New Roman" pitchFamily="18" charset="0"/>
+            </a:endParaRPr>
           </a:p>
           <a:p>
             <a:pPr algn="ctr"/>
-            <a:endParaRPr lang="en-US" dirty="0"/>
+            <a:endParaRPr lang="en-US" dirty="0">
+              <a:latin typeface="Times New Roman" pitchFamily="18" charset="0"/>
+              <a:cs typeface="Times New Roman" pitchFamily="18" charset="0"/>
+            </a:endParaRPr>
           </a:p>
           <a:p>
             <a:pPr algn="ctr"/>
-            <a:endParaRPr lang="en-US" dirty="0" smtClean="0"/>
+            <a:endParaRPr lang="en-US" dirty="0" smtClean="0">
+              <a:latin typeface="Times New Roman" pitchFamily="18" charset="0"/>
+              <a:cs typeface="Times New Roman" pitchFamily="18" charset="0"/>
+            </a:endParaRPr>
           </a:p>
           <a:p>
             <a:pPr algn="r"/>
             <a:r>
-              <a:rPr lang="ru-RU" dirty="0" smtClean="0"/>
+              <a:rPr lang="ru-RU" dirty="0" smtClean="0">
+                <a:latin typeface="Times New Roman" pitchFamily="18" charset="0"/>
+                <a:cs typeface="Times New Roman" pitchFamily="18" charset="0"/>
+              </a:rPr>
               <a:t>Автор работы:</a:t>
             </a:r>
           </a:p>
           <a:p>
             <a:pPr algn="r"/>
             <a:r>
-              <a:rPr lang="ru-RU" dirty="0" smtClean="0"/>
+              <a:rPr lang="ru-RU" dirty="0" smtClean="0">
+                <a:latin typeface="Times New Roman" pitchFamily="18" charset="0"/>
+                <a:cs typeface="Times New Roman" pitchFamily="18" charset="0"/>
+              </a:rPr>
               <a:t>Студент группы ЕТ-411</a:t>
             </a:r>
           </a:p>
           <a:p>
             <a:pPr algn="r"/>
             <a:r>
-              <a:rPr lang="ru-RU" dirty="0" smtClean="0"/>
+              <a:rPr lang="ru-RU" dirty="0" smtClean="0">
+                <a:latin typeface="Times New Roman" pitchFamily="18" charset="0"/>
+                <a:cs typeface="Times New Roman" pitchFamily="18" charset="0"/>
+              </a:rPr>
               <a:t>А.С. Клепиков</a:t>
             </a:r>
           </a:p>
           <a:p>
             <a:pPr algn="r"/>
-            <a:endParaRPr lang="ru-RU" dirty="0"/>
+            <a:endParaRPr lang="ru-RU" dirty="0">
+              <a:latin typeface="Times New Roman" pitchFamily="18" charset="0"/>
+              <a:cs typeface="Times New Roman" pitchFamily="18" charset="0"/>
+            </a:endParaRPr>
           </a:p>
           <a:p>
             <a:pPr algn="r"/>
             <a:r>
-              <a:rPr lang="ru-RU" dirty="0" smtClean="0"/>
+              <a:rPr lang="ru-RU" dirty="0" smtClean="0">
+                <a:latin typeface="Times New Roman" pitchFamily="18" charset="0"/>
+                <a:cs typeface="Times New Roman" pitchFamily="18" charset="0"/>
+              </a:rPr>
               <a:t>Руководитель:</a:t>
             </a:r>
           </a:p>
           <a:p>
             <a:pPr algn="r"/>
             <a:r>
-              <a:rPr lang="ru-RU" dirty="0" smtClean="0"/>
+              <a:rPr lang="ru-RU" dirty="0" smtClean="0">
+                <a:latin typeface="Times New Roman" pitchFamily="18" charset="0"/>
+                <a:cs typeface="Times New Roman" pitchFamily="18" charset="0"/>
+              </a:rPr>
               <a:t>Доцент кафедры, </a:t>
             </a:r>
           </a:p>
           <a:p>
             <a:pPr algn="r"/>
             <a:r>
-              <a:rPr lang="ru-RU" dirty="0" smtClean="0"/>
+              <a:rPr lang="ru-RU" dirty="0" smtClean="0">
+                <a:latin typeface="Times New Roman" pitchFamily="18" charset="0"/>
+                <a:cs typeface="Times New Roman" pitchFamily="18" charset="0"/>
+              </a:rPr>
               <a:t>к.ф.-м.н., доцент</a:t>
             </a:r>
           </a:p>
           <a:p>
             <a:pPr algn="r"/>
             <a:r>
-              <a:rPr lang="ru-RU" dirty="0" smtClean="0"/>
+              <a:rPr lang="ru-RU" dirty="0" smtClean="0">
+                <a:latin typeface="Times New Roman" pitchFamily="18" charset="0"/>
+                <a:cs typeface="Times New Roman" pitchFamily="18" charset="0"/>
+              </a:rPr>
               <a:t>М.А. </a:t>
             </a:r>
             <a:r>
-              <a:rPr lang="ru-RU" dirty="0" err="1" smtClean="0"/>
+              <a:rPr lang="ru-RU" dirty="0" err="1" smtClean="0">
+                <a:latin typeface="Times New Roman" pitchFamily="18" charset="0"/>
+                <a:cs typeface="Times New Roman" pitchFamily="18" charset="0"/>
+              </a:rPr>
               <a:t>Сагадеева</a:t>
             </a:r>
-            <a:endParaRPr lang="ru-RU" dirty="0" smtClean="0"/>
+            <a:endParaRPr lang="ru-RU" dirty="0" smtClean="0">
+              <a:latin typeface="Times New Roman" pitchFamily="18" charset="0"/>
+              <a:cs typeface="Times New Roman" pitchFamily="18" charset="0"/>
+            </a:endParaRPr>
           </a:p>
           <a:p>
             <a:pPr algn="r"/>
-            <a:endParaRPr lang="ru-RU" dirty="0"/>
+            <a:endParaRPr lang="ru-RU" dirty="0">
+              <a:latin typeface="Times New Roman" pitchFamily="18" charset="0"/>
+              <a:cs typeface="Times New Roman" pitchFamily="18" charset="0"/>
+            </a:endParaRPr>
           </a:p>
           <a:p>
             <a:pPr algn="r"/>
-            <a:endParaRPr lang="ru-RU" dirty="0" smtClean="0"/>
-          </a:p>
-          <a:p>
-            <a:pPr algn="ctr"/>
-            <a:r>
-              <a:rPr lang="ru-RU" dirty="0" smtClean="0"/>
+            <a:endParaRPr lang="ru-RU" dirty="0" smtClean="0">
+              <a:latin typeface="Times New Roman" pitchFamily="18" charset="0"/>
+              <a:cs typeface="Times New Roman" pitchFamily="18" charset="0"/>
+            </a:endParaRPr>
+          </a:p>
+        </p:txBody>
+      </p:sp>
+      <p:sp>
+        <p:nvSpPr>
+          <p:cNvPr id="2" name="Нижний колонтитул 1"/>
+          <p:cNvSpPr>
+            <a:spLocks noGrp="1"/>
+          </p:cNvSpPr>
+          <p:nvPr>
+            <p:ph type="ftr" sz="quarter" idx="11"/>
+          </p:nvPr>
+        </p:nvSpPr>
+        <p:spPr/>
+        <p:txBody>
+          <a:bodyPr/>
+          <a:lstStyle/>
+          <a:p>
+            <a:r>
+              <a:rPr lang="ru-RU" sz="1800" dirty="0" smtClean="0">
+                <a:latin typeface="Times New Roman" pitchFamily="18" charset="0"/>
+                <a:cs typeface="Times New Roman" pitchFamily="18" charset="0"/>
+              </a:rPr>
               <a:t>Челябинск 2019</a:t>
             </a:r>
-            <a:endParaRPr lang="ru-RU" dirty="0"/>
+            <a:endParaRPr lang="ru-RU" sz="1800" dirty="0">
+              <a:latin typeface="Times New Roman" pitchFamily="18" charset="0"/>
+              <a:cs typeface="Times New Roman" pitchFamily="18" charset="0"/>
+            </a:endParaRPr>
           </a:p>
         </p:txBody>
       </p:sp>
@@ -3880,10 +4009,16 @@
           <a:lstStyle/>
           <a:p>
             <a:r>
-              <a:rPr lang="ru-RU" dirty="0" smtClean="0"/>
+              <a:rPr lang="ru-RU" dirty="0" smtClean="0">
+                <a:latin typeface="Times New Roman" pitchFamily="18" charset="0"/>
+                <a:cs typeface="Times New Roman" pitchFamily="18" charset="0"/>
+              </a:rPr>
               <a:t>Структура аналитических модулей</a:t>
             </a:r>
-            <a:endParaRPr lang="ru-RU" dirty="0"/>
+            <a:endParaRPr lang="ru-RU" dirty="0">
+              <a:latin typeface="Times New Roman" pitchFamily="18" charset="0"/>
+              <a:cs typeface="Times New Roman" pitchFamily="18" charset="0"/>
+            </a:endParaRPr>
           </a:p>
         </p:txBody>
       </p:sp>
@@ -3985,10 +4120,16 @@
           <a:lstStyle/>
           <a:p>
             <a:r>
-              <a:rPr lang="ru-RU" dirty="0" smtClean="0"/>
+              <a:rPr lang="ru-RU" dirty="0" smtClean="0">
+                <a:latin typeface="Times New Roman" pitchFamily="18" charset="0"/>
+                <a:cs typeface="Times New Roman" pitchFamily="18" charset="0"/>
+              </a:rPr>
               <a:t>Сбор и сохранение данных</a:t>
             </a:r>
-            <a:endParaRPr lang="ru-RU" dirty="0"/>
+            <a:endParaRPr lang="ru-RU" dirty="0">
+              <a:latin typeface="Times New Roman" pitchFamily="18" charset="0"/>
+              <a:cs typeface="Times New Roman" pitchFamily="18" charset="0"/>
+            </a:endParaRPr>
           </a:p>
         </p:txBody>
       </p:sp>
@@ -4013,15 +4154,24 @@
               <a:buNone/>
             </a:pPr>
             <a:r>
-              <a:rPr lang="ru-RU" dirty="0" smtClean="0"/>
+              <a:rPr lang="ru-RU" dirty="0" smtClean="0">
+                <a:latin typeface="Times New Roman" pitchFamily="18" charset="0"/>
+                <a:cs typeface="Times New Roman" pitchFamily="18" charset="0"/>
+              </a:rPr>
               <a:t>	Сбор данных ведётся посредством </a:t>
             </a:r>
             <a:r>
-              <a:rPr lang="ru-RU" dirty="0" err="1" smtClean="0"/>
+              <a:rPr lang="ru-RU" dirty="0" err="1" smtClean="0">
+                <a:latin typeface="Times New Roman" pitchFamily="18" charset="0"/>
+                <a:cs typeface="Times New Roman" pitchFamily="18" charset="0"/>
+              </a:rPr>
               <a:t>парсинга</a:t>
             </a:r>
             <a:r>
-              <a:rPr lang="ru-RU" dirty="0" smtClean="0"/>
+              <a:rPr lang="ru-RU" dirty="0" smtClean="0">
+                <a:latin typeface="Times New Roman" pitchFamily="18" charset="0"/>
+                <a:cs typeface="Times New Roman" pitchFamily="18" charset="0"/>
+              </a:rPr>
               <a:t> веб-страницы с торгами. Проверяется, активна ли площадка, и если да, то данные собираются раз в минуту. Иначе – перепроверка через 10 минут.</a:t>
             </a:r>
           </a:p>
@@ -4030,20 +4180,11 @@
               <a:buNone/>
             </a:pPr>
             <a:r>
-              <a:rPr lang="ru-RU" dirty="0" smtClean="0"/>
-              <a:t>	Как только получена цена акции, она пишется в </a:t>
-            </a:r>
-            <a:r>
-              <a:rPr lang="ru-RU" dirty="0" smtClean="0"/>
-              <a:t>файл</a:t>
-            </a:r>
-            <a:r>
-              <a:rPr lang="ru-RU" dirty="0" smtClean="0"/>
-              <a:t>. При последующем запуске приложения файл будет прочитан, данные будут занесены во внутренний	 список для дальнейшей работы с ними</a:t>
-            </a:r>
-            <a:r>
-              <a:rPr lang="ru-RU" dirty="0" smtClean="0"/>
-              <a:t>.</a:t>
+              <a:rPr lang="ru-RU" dirty="0" smtClean="0">
+                <a:latin typeface="Times New Roman" pitchFamily="18" charset="0"/>
+                <a:cs typeface="Times New Roman" pitchFamily="18" charset="0"/>
+              </a:rPr>
+              <a:t>	Как только получена цена акции, она пишется в файл. При последующем запуске приложения файл будет прочитан, данные будут занесены во внутренний	 список для дальнейшей работы с ними.</a:t>
             </a:r>
           </a:p>
           <a:p>
@@ -4051,38 +4192,65 @@
               <a:buNone/>
             </a:pPr>
             <a:r>
-              <a:rPr lang="ru-RU" dirty="0"/>
+              <a:rPr lang="ru-RU" dirty="0">
+                <a:latin typeface="Times New Roman" pitchFamily="18" charset="0"/>
+                <a:cs typeface="Times New Roman" pitchFamily="18" charset="0"/>
+              </a:rPr>
               <a:t>	</a:t>
             </a:r>
             <a:r>
-              <a:rPr lang="ru-RU" dirty="0" smtClean="0"/>
+              <a:rPr lang="ru-RU" dirty="0" smtClean="0">
+                <a:latin typeface="Times New Roman" pitchFamily="18" charset="0"/>
+                <a:cs typeface="Times New Roman" pitchFamily="18" charset="0"/>
+              </a:rPr>
               <a:t>Для сохранения данных был выбран формат данных </a:t>
             </a:r>
             <a:r>
-              <a:rPr lang="en-US" dirty="0" smtClean="0"/>
+              <a:rPr lang="en-US" dirty="0" smtClean="0">
+                <a:latin typeface="Times New Roman" pitchFamily="18" charset="0"/>
+                <a:cs typeface="Times New Roman" pitchFamily="18" charset="0"/>
+              </a:rPr>
               <a:t>JSON</a:t>
             </a:r>
             <a:r>
-              <a:rPr lang="ru-RU" dirty="0" smtClean="0"/>
+              <a:rPr lang="ru-RU" dirty="0" smtClean="0">
+                <a:latin typeface="Times New Roman" pitchFamily="18" charset="0"/>
+                <a:cs typeface="Times New Roman" pitchFamily="18" charset="0"/>
+              </a:rPr>
               <a:t>, основанный на языке программирования </a:t>
             </a:r>
             <a:r>
-              <a:rPr lang="en-US" dirty="0" smtClean="0"/>
+              <a:rPr lang="en-US" dirty="0" smtClean="0">
+                <a:latin typeface="Times New Roman" pitchFamily="18" charset="0"/>
+                <a:cs typeface="Times New Roman" pitchFamily="18" charset="0"/>
+              </a:rPr>
               <a:t>JavaScript. </a:t>
             </a:r>
             <a:r>
-              <a:rPr lang="ru-RU" dirty="0" smtClean="0"/>
+              <a:rPr lang="ru-RU" dirty="0" smtClean="0">
+                <a:latin typeface="Times New Roman" pitchFamily="18" charset="0"/>
+                <a:cs typeface="Times New Roman" pitchFamily="18" charset="0"/>
+              </a:rPr>
               <a:t>Данные пишутся в формате дата-цена, где дата в формате </a:t>
             </a:r>
             <a:r>
-              <a:rPr lang="en-US" dirty="0" smtClean="0"/>
+              <a:rPr lang="en-US" dirty="0" smtClean="0">
+                <a:latin typeface="Times New Roman" pitchFamily="18" charset="0"/>
+                <a:cs typeface="Times New Roman" pitchFamily="18" charset="0"/>
+              </a:rPr>
               <a:t>UNIX</a:t>
             </a:r>
             <a:r>
-              <a:rPr lang="ru-RU" dirty="0" smtClean="0"/>
+              <a:rPr lang="ru-RU" dirty="0" smtClean="0">
+                <a:latin typeface="Times New Roman" pitchFamily="18" charset="0"/>
+                <a:cs typeface="Times New Roman" pitchFamily="18" charset="0"/>
+              </a:rPr>
               <a:t>, а цена в формате числа с плавающей точкой двойной точности. Пример такого файла приведён на следующем слайде.</a:t>
             </a:r>
-            <a:endParaRPr lang="ru-RU" dirty="0"/>
+            <a:endParaRPr lang="ru-RU" dirty="0">
+              <a:latin typeface="Times New Roman" pitchFamily="18" charset="0"/>
+              <a:cs typeface="Times New Roman" pitchFamily="18" charset="0"/>
+            </a:endParaRPr>
           </a:p>
         </p:txBody>
       </p:sp>
@@ -4155,18 +4323,30 @@
           <a:lstStyle/>
           <a:p>
             <a:r>
-              <a:rPr lang="ru-RU" dirty="0" smtClean="0"/>
+              <a:rPr lang="ru-RU" dirty="0" smtClean="0">
+                <a:latin typeface="Times New Roman" pitchFamily="18" charset="0"/>
+                <a:cs typeface="Times New Roman" pitchFamily="18" charset="0"/>
+              </a:rPr>
               <a:t>Пример </a:t>
             </a:r>
             <a:r>
-              <a:rPr lang="en-US" dirty="0" smtClean="0"/>
+              <a:rPr lang="en-US" dirty="0" smtClean="0">
+                <a:latin typeface="Times New Roman" pitchFamily="18" charset="0"/>
+                <a:cs typeface="Times New Roman" pitchFamily="18" charset="0"/>
+              </a:rPr>
               <a:t>JSON-</a:t>
             </a:r>
             <a:r>
-              <a:rPr lang="ru-RU" dirty="0" smtClean="0"/>
+              <a:rPr lang="ru-RU" dirty="0" smtClean="0">
+                <a:latin typeface="Times New Roman" pitchFamily="18" charset="0"/>
+                <a:cs typeface="Times New Roman" pitchFamily="18" charset="0"/>
+              </a:rPr>
               <a:t>файла с данными</a:t>
             </a:r>
-            <a:endParaRPr lang="ru-RU" dirty="0"/>
+            <a:endParaRPr lang="ru-RU" dirty="0">
+              <a:latin typeface="Times New Roman" pitchFamily="18" charset="0"/>
+              <a:cs typeface="Times New Roman" pitchFamily="18" charset="0"/>
+            </a:endParaRPr>
           </a:p>
         </p:txBody>
       </p:sp>
@@ -4268,10 +4448,16 @@
           <a:lstStyle/>
           <a:p>
             <a:r>
-              <a:rPr lang="ru-RU" dirty="0" smtClean="0"/>
+              <a:rPr lang="ru-RU" dirty="0" smtClean="0">
+                <a:latin typeface="Times New Roman" pitchFamily="18" charset="0"/>
+                <a:cs typeface="Times New Roman" pitchFamily="18" charset="0"/>
+              </a:rPr>
               <a:t>Пример работы приложения</a:t>
             </a:r>
-            <a:endParaRPr lang="ru-RU" dirty="0"/>
+            <a:endParaRPr lang="ru-RU" dirty="0">
+              <a:latin typeface="Times New Roman" pitchFamily="18" charset="0"/>
+              <a:cs typeface="Times New Roman" pitchFamily="18" charset="0"/>
+            </a:endParaRPr>
           </a:p>
         </p:txBody>
       </p:sp>
@@ -4373,10 +4559,16 @@
           <a:lstStyle/>
           <a:p>
             <a:r>
-              <a:rPr lang="ru-RU" dirty="0" smtClean="0"/>
+              <a:rPr lang="ru-RU" dirty="0" smtClean="0">
+                <a:latin typeface="Times New Roman" pitchFamily="18" charset="0"/>
+                <a:cs typeface="Times New Roman" pitchFamily="18" charset="0"/>
+              </a:rPr>
               <a:t>Заключение</a:t>
             </a:r>
-            <a:endParaRPr lang="ru-RU" dirty="0"/>
+            <a:endParaRPr lang="ru-RU" dirty="0">
+              <a:latin typeface="Times New Roman" pitchFamily="18" charset="0"/>
+              <a:cs typeface="Times New Roman" pitchFamily="18" charset="0"/>
+            </a:endParaRPr>
           </a:p>
         </p:txBody>
       </p:sp>
@@ -4401,47 +4593,71 @@
               <a:buNone/>
             </a:pPr>
             <a:r>
-              <a:rPr lang="ru-RU" dirty="0"/>
+              <a:rPr lang="ru-RU" dirty="0">
+                <a:latin typeface="Times New Roman" pitchFamily="18" charset="0"/>
+                <a:cs typeface="Times New Roman" pitchFamily="18" charset="0"/>
+              </a:rPr>
               <a:t>	</a:t>
             </a:r>
             <a:r>
-              <a:rPr lang="ru-RU" dirty="0" smtClean="0"/>
+              <a:rPr lang="ru-RU" dirty="0" smtClean="0">
+                <a:latin typeface="Times New Roman" pitchFamily="18" charset="0"/>
+                <a:cs typeface="Times New Roman" pitchFamily="18" charset="0"/>
+              </a:rPr>
               <a:t>В результате выполнения работы было построено приложение, способное:</a:t>
             </a:r>
           </a:p>
           <a:p>
             <a:pPr algn="just"/>
             <a:r>
-              <a:rPr lang="ru-RU" dirty="0" smtClean="0"/>
+              <a:rPr lang="ru-RU" dirty="0" smtClean="0">
+                <a:latin typeface="Times New Roman" pitchFamily="18" charset="0"/>
+                <a:cs typeface="Times New Roman" pitchFamily="18" charset="0"/>
+              </a:rPr>
               <a:t> автономно выполнять поиск значений акций посредством </a:t>
             </a:r>
             <a:r>
-              <a:rPr lang="ru-RU" dirty="0" err="1" smtClean="0"/>
+              <a:rPr lang="ru-RU" dirty="0" err="1" smtClean="0">
+                <a:latin typeface="Times New Roman" pitchFamily="18" charset="0"/>
+                <a:cs typeface="Times New Roman" pitchFamily="18" charset="0"/>
+              </a:rPr>
               <a:t>парсинга</a:t>
             </a:r>
             <a:r>
-              <a:rPr lang="ru-RU" dirty="0" smtClean="0"/>
+              <a:rPr lang="ru-RU" dirty="0" smtClean="0">
+                <a:latin typeface="Times New Roman" pitchFamily="18" charset="0"/>
+                <a:cs typeface="Times New Roman" pitchFamily="18" charset="0"/>
+              </a:rPr>
               <a:t> веб-страницы;</a:t>
             </a:r>
           </a:p>
           <a:p>
             <a:pPr algn="just"/>
             <a:r>
-              <a:rPr lang="ru-RU" dirty="0" smtClean="0"/>
+              <a:rPr lang="ru-RU" dirty="0" smtClean="0">
+                <a:latin typeface="Times New Roman" pitchFamily="18" charset="0"/>
+                <a:cs typeface="Times New Roman" pitchFamily="18" charset="0"/>
+              </a:rPr>
               <a:t>записывать сохранённые результаты в файл и читать их в дальнейшем;</a:t>
             </a:r>
           </a:p>
           <a:p>
             <a:pPr algn="just"/>
             <a:r>
-              <a:rPr lang="ru-RU" dirty="0" smtClean="0"/>
+              <a:rPr lang="ru-RU" dirty="0" smtClean="0">
+                <a:latin typeface="Times New Roman" pitchFamily="18" charset="0"/>
+                <a:cs typeface="Times New Roman" pitchFamily="18" charset="0"/>
+              </a:rPr>
               <a:t>проводить анализ собранных данных и строить прогноз на их основе;</a:t>
             </a:r>
           </a:p>
           <a:p>
             <a:pPr algn="just"/>
             <a:r>
-              <a:rPr lang="ru-RU" dirty="0" smtClean="0"/>
+              <a:rPr lang="ru-RU" dirty="0" smtClean="0">
+                <a:latin typeface="Times New Roman" pitchFamily="18" charset="0"/>
+                <a:cs typeface="Times New Roman" pitchFamily="18" charset="0"/>
+              </a:rPr>
               <a:t>выводить результаты анализа и прогноза на график.</a:t>
             </a:r>
           </a:p>
@@ -4450,10 +4666,16 @@
               <a:buNone/>
             </a:pPr>
             <a:r>
-              <a:rPr lang="ru-RU" dirty="0" smtClean="0"/>
+              <a:rPr lang="ru-RU" dirty="0" smtClean="0">
+                <a:latin typeface="Times New Roman" pitchFamily="18" charset="0"/>
+                <a:cs typeface="Times New Roman" pitchFamily="18" charset="0"/>
+              </a:rPr>
               <a:t>	Таким образом, все цели и задачи были достигнуты.</a:t>
             </a:r>
-            <a:endParaRPr lang="ru-RU" dirty="0"/>
+            <a:endParaRPr lang="ru-RU" dirty="0">
+              <a:latin typeface="Times New Roman" pitchFamily="18" charset="0"/>
+              <a:cs typeface="Times New Roman" pitchFamily="18" charset="0"/>
+            </a:endParaRPr>
           </a:p>
         </p:txBody>
       </p:sp>
@@ -4526,10 +4748,16 @@
           <a:lstStyle/>
           <a:p>
             <a:r>
-              <a:rPr lang="ru-RU" dirty="0" smtClean="0"/>
+              <a:rPr lang="ru-RU" dirty="0" smtClean="0">
+                <a:latin typeface="Times New Roman" pitchFamily="18" charset="0"/>
+                <a:cs typeface="Times New Roman" pitchFamily="18" charset="0"/>
+              </a:rPr>
               <a:t>Содержание работы</a:t>
             </a:r>
-            <a:endParaRPr lang="ru-RU" dirty="0"/>
+            <a:endParaRPr lang="ru-RU" dirty="0">
+              <a:latin typeface="Times New Roman" pitchFamily="18" charset="0"/>
+              <a:cs typeface="Times New Roman" pitchFamily="18" charset="0"/>
+            </a:endParaRPr>
           </a:p>
         </p:txBody>
       </p:sp>
@@ -4557,58 +4785,93 @@
           <a:p>
             <a:pPr algn="just"/>
             <a:r>
-              <a:rPr lang="ru-RU" sz="2800" dirty="0" smtClean="0"/>
+              <a:rPr lang="ru-RU" sz="2800" dirty="0" smtClean="0">
+                <a:latin typeface="Times New Roman" pitchFamily="18" charset="0"/>
+                <a:cs typeface="Times New Roman" pitchFamily="18" charset="0"/>
+              </a:rPr>
               <a:t>	Работа посвящена автоматизированному сбору цен на акции «</a:t>
             </a:r>
             <a:r>
-              <a:rPr lang="en-US" sz="2800" dirty="0" smtClean="0"/>
+              <a:rPr lang="en-US" sz="2800" dirty="0" smtClean="0">
+                <a:latin typeface="Times New Roman" pitchFamily="18" charset="0"/>
+                <a:cs typeface="Times New Roman" pitchFamily="18" charset="0"/>
+              </a:rPr>
               <a:t>Samsung</a:t>
             </a:r>
             <a:r>
-              <a:rPr lang="ru-RU" sz="2800" dirty="0" smtClean="0"/>
+              <a:rPr lang="ru-RU" sz="2800" dirty="0" smtClean="0">
+                <a:latin typeface="Times New Roman" pitchFamily="18" charset="0"/>
+                <a:cs typeface="Times New Roman" pitchFamily="18" charset="0"/>
+              </a:rPr>
               <a:t> </a:t>
             </a:r>
             <a:r>
-              <a:rPr lang="en-US" sz="2800" dirty="0" smtClean="0"/>
+              <a:rPr lang="en-US" sz="2800" dirty="0" smtClean="0">
+                <a:latin typeface="Times New Roman" pitchFamily="18" charset="0"/>
+                <a:cs typeface="Times New Roman" pitchFamily="18" charset="0"/>
+              </a:rPr>
               <a:t>Electronics Co.</a:t>
             </a:r>
             <a:r>
-              <a:rPr lang="ru-RU" sz="2800" dirty="0" smtClean="0"/>
-              <a:t>» и последующему анализу и прогнозированию полученного временного ряда</a:t>
-            </a:r>
-            <a:r>
-              <a:rPr lang="ru-RU" sz="2800" dirty="0" smtClean="0"/>
-              <a:t>.</a:t>
-            </a:r>
-            <a:endParaRPr lang="en-US" sz="2800" dirty="0" smtClean="0"/>
+              <a:rPr lang="ru-RU" sz="2800" dirty="0" smtClean="0">
+                <a:latin typeface="Times New Roman" pitchFamily="18" charset="0"/>
+                <a:cs typeface="Times New Roman" pitchFamily="18" charset="0"/>
+              </a:rPr>
+              <a:t>» и последующему анализу и прогнозированию полученного временного ряда.</a:t>
+            </a:r>
+            <a:endParaRPr lang="en-US" sz="2800" dirty="0" smtClean="0">
+              <a:latin typeface="Times New Roman" pitchFamily="18" charset="0"/>
+              <a:cs typeface="Times New Roman" pitchFamily="18" charset="0"/>
+            </a:endParaRPr>
           </a:p>
           <a:p>
             <a:pPr algn="just"/>
-            <a:endParaRPr lang="en-US" sz="2800" dirty="0"/>
+            <a:endParaRPr lang="en-US" sz="2800" dirty="0">
+              <a:latin typeface="Times New Roman" pitchFamily="18" charset="0"/>
+              <a:cs typeface="Times New Roman" pitchFamily="18" charset="0"/>
+            </a:endParaRPr>
           </a:p>
           <a:p>
             <a:pPr algn="just"/>
-            <a:endParaRPr lang="en-US" sz="2800" dirty="0" smtClean="0"/>
+            <a:endParaRPr lang="en-US" sz="2800" dirty="0" smtClean="0">
+              <a:latin typeface="Times New Roman" pitchFamily="18" charset="0"/>
+              <a:cs typeface="Times New Roman" pitchFamily="18" charset="0"/>
+            </a:endParaRPr>
           </a:p>
           <a:p>
             <a:pPr algn="just"/>
-            <a:endParaRPr lang="en-US" sz="2800" dirty="0"/>
+            <a:endParaRPr lang="en-US" sz="2800" dirty="0">
+              <a:latin typeface="Times New Roman" pitchFamily="18" charset="0"/>
+              <a:cs typeface="Times New Roman" pitchFamily="18" charset="0"/>
+            </a:endParaRPr>
           </a:p>
           <a:p>
             <a:pPr algn="just"/>
-            <a:endParaRPr lang="en-US" sz="2800" dirty="0" smtClean="0"/>
+            <a:endParaRPr lang="en-US" sz="2800" dirty="0" smtClean="0">
+              <a:latin typeface="Times New Roman" pitchFamily="18" charset="0"/>
+              <a:cs typeface="Times New Roman" pitchFamily="18" charset="0"/>
+            </a:endParaRPr>
           </a:p>
           <a:p>
             <a:pPr algn="just"/>
-            <a:endParaRPr lang="en-US" sz="2800" dirty="0"/>
+            <a:endParaRPr lang="en-US" sz="2800" dirty="0">
+              <a:latin typeface="Times New Roman" pitchFamily="18" charset="0"/>
+              <a:cs typeface="Times New Roman" pitchFamily="18" charset="0"/>
+            </a:endParaRPr>
           </a:p>
           <a:p>
             <a:pPr algn="ctr"/>
-            <a:endParaRPr lang="en-US" sz="2800" dirty="0" smtClean="0"/>
+            <a:endParaRPr lang="en-US" sz="2800" dirty="0" smtClean="0">
+              <a:latin typeface="Times New Roman" pitchFamily="18" charset="0"/>
+              <a:cs typeface="Times New Roman" pitchFamily="18" charset="0"/>
+            </a:endParaRPr>
           </a:p>
           <a:p>
             <a:pPr algn="ctr"/>
-            <a:endParaRPr lang="ru-RU" sz="1600" dirty="0"/>
+            <a:endParaRPr lang="ru-RU" sz="1600" dirty="0">
+              <a:latin typeface="Times New Roman" pitchFamily="18" charset="0"/>
+              <a:cs typeface="Times New Roman" pitchFamily="18" charset="0"/>
+            </a:endParaRPr>
           </a:p>
         </p:txBody>
       </p:sp>
@@ -4681,14 +4944,27 @@
           <a:lstStyle/>
           <a:p>
             <a:r>
+              <a:rPr lang="ru-RU" dirty="0" smtClean="0">
+                <a:latin typeface="Times New Roman" pitchFamily="18" charset="0"/>
+                <a:cs typeface="Times New Roman" pitchFamily="18" charset="0"/>
+              </a:rPr>
+              <a:t>Цель</a:t>
+            </a:r>
+            <a:r>
               <a:rPr lang="ru-RU" dirty="0" smtClean="0"/>
-              <a:t>Цель </a:t>
-            </a:r>
-            <a:r>
-              <a:rPr lang="ru-RU" dirty="0" smtClean="0"/>
+              <a:t> </a:t>
+            </a:r>
+            <a:r>
+              <a:rPr lang="ru-RU" dirty="0" smtClean="0">
+                <a:latin typeface="Times New Roman" pitchFamily="18" charset="0"/>
+                <a:cs typeface="Times New Roman" pitchFamily="18" charset="0"/>
+              </a:rPr>
               <a:t>работы</a:t>
             </a:r>
-            <a:endParaRPr lang="ru-RU" dirty="0"/>
+            <a:endParaRPr lang="ru-RU" dirty="0">
+              <a:latin typeface="Times New Roman" pitchFamily="18" charset="0"/>
+              <a:cs typeface="Times New Roman" pitchFamily="18" charset="0"/>
+            </a:endParaRPr>
           </a:p>
         </p:txBody>
       </p:sp>
@@ -4718,52 +4994,43 @@
               <a:buNone/>
             </a:pPr>
             <a:r>
-              <a:rPr lang="ru-RU" dirty="0" smtClean="0"/>
-              <a:t>	Исследование </a:t>
-            </a:r>
-            <a:r>
-              <a:rPr lang="ru-RU" dirty="0" smtClean="0"/>
-              <a:t>методов анализа и прогнозирования временных рядов, применение полученных знаний на </a:t>
-            </a:r>
-            <a:r>
-              <a:rPr lang="ru-RU" dirty="0" smtClean="0"/>
-              <a:t>практике, сбор </a:t>
-            </a:r>
-            <a:r>
-              <a:rPr lang="ru-RU" dirty="0" smtClean="0"/>
-              <a:t>данных о стоимости акций в реальном </a:t>
-            </a:r>
-            <a:r>
-              <a:rPr lang="ru-RU" dirty="0" smtClean="0"/>
-              <a:t>времени, а также анализ </a:t>
-            </a:r>
-            <a:r>
-              <a:rPr lang="ru-RU" dirty="0" smtClean="0"/>
-              <a:t>и прогнозирование полученного ряда с помощью исследованных </a:t>
-            </a:r>
-            <a:r>
-              <a:rPr lang="ru-RU" dirty="0" smtClean="0"/>
-              <a:t>методов.</a:t>
-            </a:r>
-            <a:endParaRPr lang="en-US" dirty="0" smtClean="0"/>
+              <a:rPr lang="ru-RU" dirty="0" smtClean="0">
+                <a:latin typeface="Times New Roman" pitchFamily="18" charset="0"/>
+                <a:cs typeface="Times New Roman" pitchFamily="18" charset="0"/>
+              </a:rPr>
+              <a:t>	Исследование методов анализа и прогнозирования временных рядов, применение полученных знаний на практике, сбор данных о стоимости акций в реальном времени, а также анализ и прогнозирование полученного ряда с помощью исследованных методов.</a:t>
+            </a:r>
+            <a:endParaRPr lang="en-US" dirty="0" smtClean="0">
+              <a:latin typeface="Times New Roman" pitchFamily="18" charset="0"/>
+              <a:cs typeface="Times New Roman" pitchFamily="18" charset="0"/>
+            </a:endParaRPr>
           </a:p>
           <a:p>
             <a:pPr marL="0" indent="0" algn="just">
               <a:buNone/>
             </a:pPr>
-            <a:endParaRPr lang="en-US" dirty="0" smtClean="0"/>
+            <a:endParaRPr lang="en-US" dirty="0" smtClean="0">
+              <a:latin typeface="Times New Roman" pitchFamily="18" charset="0"/>
+              <a:cs typeface="Times New Roman" pitchFamily="18" charset="0"/>
+            </a:endParaRPr>
           </a:p>
           <a:p>
             <a:pPr marL="0" indent="0" algn="ctr">
               <a:buNone/>
             </a:pPr>
-            <a:endParaRPr lang="en-US" dirty="0" smtClean="0"/>
+            <a:endParaRPr lang="en-US" dirty="0" smtClean="0">
+              <a:latin typeface="Times New Roman" pitchFamily="18" charset="0"/>
+              <a:cs typeface="Times New Roman" pitchFamily="18" charset="0"/>
+            </a:endParaRPr>
           </a:p>
           <a:p>
             <a:pPr marL="0" indent="0" algn="ctr">
               <a:buNone/>
             </a:pPr>
-            <a:endParaRPr lang="en-US" sz="1800" dirty="0" smtClean="0"/>
+            <a:endParaRPr lang="en-US" sz="1800" dirty="0" smtClean="0">
+              <a:latin typeface="Times New Roman" pitchFamily="18" charset="0"/>
+              <a:cs typeface="Times New Roman" pitchFamily="18" charset="0"/>
+            </a:endParaRPr>
           </a:p>
         </p:txBody>
       </p:sp>
@@ -4836,10 +5103,16 @@
           <a:lstStyle/>
           <a:p>
             <a:r>
-              <a:rPr lang="ru-RU" dirty="0" smtClean="0"/>
+              <a:rPr lang="ru-RU" dirty="0" smtClean="0">
+                <a:latin typeface="Times New Roman" pitchFamily="18" charset="0"/>
+                <a:cs typeface="Times New Roman" pitchFamily="18" charset="0"/>
+              </a:rPr>
               <a:t>Задачи</a:t>
             </a:r>
-            <a:endParaRPr lang="ru-RU" dirty="0"/>
+            <a:endParaRPr lang="ru-RU" dirty="0">
+              <a:latin typeface="Times New Roman" pitchFamily="18" charset="0"/>
+              <a:cs typeface="Times New Roman" pitchFamily="18" charset="0"/>
+            </a:endParaRPr>
           </a:p>
         </p:txBody>
       </p:sp>
@@ -4866,56 +5139,79 @@
           <a:lstStyle/>
           <a:p>
             <a:r>
-              <a:rPr lang="ru-RU" dirty="0" smtClean="0"/>
+              <a:rPr lang="ru-RU" dirty="0" smtClean="0">
+                <a:latin typeface="Times New Roman" pitchFamily="18" charset="0"/>
+                <a:cs typeface="Times New Roman" pitchFamily="18" charset="0"/>
+              </a:rPr>
               <a:t>Провести обзор предметной области</a:t>
             </a:r>
           </a:p>
           <a:p>
             <a:r>
-              <a:rPr lang="ru-RU" dirty="0" smtClean="0"/>
+              <a:rPr lang="ru-RU" dirty="0" smtClean="0">
+                <a:latin typeface="Times New Roman" pitchFamily="18" charset="0"/>
+                <a:cs typeface="Times New Roman" pitchFamily="18" charset="0"/>
+              </a:rPr>
               <a:t>Выбрать используемые методы</a:t>
             </a:r>
           </a:p>
           <a:p>
             <a:r>
-              <a:rPr lang="ru-RU" dirty="0" smtClean="0"/>
+              <a:rPr lang="ru-RU" dirty="0" smtClean="0">
+                <a:latin typeface="Times New Roman" pitchFamily="18" charset="0"/>
+                <a:cs typeface="Times New Roman" pitchFamily="18" charset="0"/>
+              </a:rPr>
               <a:t>Реализовать методы программно</a:t>
             </a:r>
           </a:p>
           <a:p>
             <a:r>
-              <a:rPr lang="ru-RU" dirty="0" smtClean="0"/>
+              <a:rPr lang="ru-RU" dirty="0" smtClean="0">
+                <a:latin typeface="Times New Roman" pitchFamily="18" charset="0"/>
+                <a:cs typeface="Times New Roman" pitchFamily="18" charset="0"/>
+              </a:rPr>
               <a:t>Реализовать в полученном приложении пользовательский интерфейс</a:t>
             </a:r>
           </a:p>
           <a:p>
             <a:r>
-              <a:rPr lang="ru-RU" dirty="0" smtClean="0"/>
-              <a:t>Реализовать автоматизированный сбор </a:t>
-            </a:r>
-            <a:r>
-              <a:rPr lang="ru-RU" dirty="0" smtClean="0"/>
-              <a:t>данных</a:t>
-            </a:r>
-            <a:endParaRPr lang="en-US" dirty="0" smtClean="0"/>
+              <a:rPr lang="ru-RU" dirty="0" smtClean="0">
+                <a:latin typeface="Times New Roman" pitchFamily="18" charset="0"/>
+                <a:cs typeface="Times New Roman" pitchFamily="18" charset="0"/>
+              </a:rPr>
+              <a:t>Реализовать автоматизированный сбор данных</a:t>
+            </a:r>
+            <a:endParaRPr lang="en-US" dirty="0" smtClean="0">
+              <a:latin typeface="Times New Roman" pitchFamily="18" charset="0"/>
+              <a:cs typeface="Times New Roman" pitchFamily="18" charset="0"/>
+            </a:endParaRPr>
           </a:p>
           <a:p>
             <a:pPr marL="0" indent="0" algn="ctr">
               <a:buNone/>
             </a:pPr>
-            <a:endParaRPr lang="en-US" sz="1800" dirty="0" smtClean="0"/>
+            <a:endParaRPr lang="en-US" sz="1800" dirty="0" smtClean="0">
+              <a:latin typeface="Times New Roman" pitchFamily="18" charset="0"/>
+              <a:cs typeface="Times New Roman" pitchFamily="18" charset="0"/>
+            </a:endParaRPr>
           </a:p>
           <a:p>
             <a:pPr marL="0" indent="0" algn="ctr">
               <a:buNone/>
             </a:pPr>
-            <a:endParaRPr lang="en-US" sz="1800" dirty="0"/>
+            <a:endParaRPr lang="en-US" sz="1800" dirty="0">
+              <a:latin typeface="Times New Roman" pitchFamily="18" charset="0"/>
+              <a:cs typeface="Times New Roman" pitchFamily="18" charset="0"/>
+            </a:endParaRPr>
           </a:p>
           <a:p>
             <a:pPr marL="0" indent="0" algn="ctr">
               <a:buNone/>
             </a:pPr>
-            <a:endParaRPr lang="ru-RU" sz="1800" dirty="0"/>
+            <a:endParaRPr lang="ru-RU" sz="1800" dirty="0">
+              <a:latin typeface="Times New Roman" pitchFamily="18" charset="0"/>
+              <a:cs typeface="Times New Roman" pitchFamily="18" charset="0"/>
+            </a:endParaRPr>
           </a:p>
         </p:txBody>
       </p:sp>
@@ -4988,10 +5284,16 @@
           <a:lstStyle/>
           <a:p>
             <a:r>
-              <a:rPr lang="ru-RU" dirty="0" smtClean="0"/>
+              <a:rPr lang="ru-RU" dirty="0" smtClean="0">
+                <a:latin typeface="Times New Roman" pitchFamily="18" charset="0"/>
+                <a:cs typeface="Times New Roman" pitchFamily="18" charset="0"/>
+              </a:rPr>
               <a:t>Общая информация</a:t>
             </a:r>
-            <a:endParaRPr lang="ru-RU" dirty="0"/>
+            <a:endParaRPr lang="ru-RU" dirty="0">
+              <a:latin typeface="Times New Roman" pitchFamily="18" charset="0"/>
+              <a:cs typeface="Times New Roman" pitchFamily="18" charset="0"/>
+            </a:endParaRPr>
           </a:p>
         </p:txBody>
       </p:sp>
@@ -5021,16 +5323,18 @@
               <a:buNone/>
             </a:pPr>
             <a:r>
-              <a:rPr lang="ru-RU" dirty="0" smtClean="0"/>
+              <a:rPr lang="ru-RU" dirty="0" smtClean="0">
+                <a:latin typeface="Times New Roman" pitchFamily="18" charset="0"/>
+                <a:cs typeface="Times New Roman" pitchFamily="18" charset="0"/>
+              </a:rPr>
               <a:t>	</a:t>
             </a:r>
             <a:r>
-              <a:rPr lang="ru-RU" sz="3400" dirty="0" smtClean="0"/>
-              <a:t>На текущий момент большая доля рынка представлена акциями, цены на которые меняются часто</a:t>
-            </a:r>
-            <a:r>
-              <a:rPr lang="ru-RU" sz="3400" dirty="0" smtClean="0"/>
-              <a:t>.</a:t>
+              <a:rPr lang="ru-RU" sz="3400" dirty="0" smtClean="0">
+                <a:latin typeface="Times New Roman" pitchFamily="18" charset="0"/>
+                <a:cs typeface="Times New Roman" pitchFamily="18" charset="0"/>
+              </a:rPr>
+              <a:t>На текущий момент большая доля рынка представлена акциями, цены на которые меняются часто.</a:t>
             </a:r>
           </a:p>
           <a:p>
@@ -5038,19 +5342,31 @@
               <a:buNone/>
             </a:pPr>
             <a:r>
-              <a:rPr lang="ru-RU" sz="3400" dirty="0"/>
+              <a:rPr lang="ru-RU" sz="3400" dirty="0">
+                <a:latin typeface="Times New Roman" pitchFamily="18" charset="0"/>
+                <a:cs typeface="Times New Roman" pitchFamily="18" charset="0"/>
+              </a:rPr>
               <a:t>	</a:t>
             </a:r>
             <a:r>
-              <a:rPr lang="ru-RU" sz="3400" dirty="0" smtClean="0"/>
+              <a:rPr lang="ru-RU" sz="3400" dirty="0" smtClean="0">
+                <a:latin typeface="Times New Roman" pitchFamily="18" charset="0"/>
+                <a:cs typeface="Times New Roman" pitchFamily="18" charset="0"/>
+              </a:rPr>
               <a:t>Предсказывая цены на акции возможно получать доход с покупки</a:t>
             </a:r>
             <a:r>
-              <a:rPr lang="en-US" sz="3400" dirty="0" smtClean="0"/>
+              <a:rPr lang="en-US" sz="3400" dirty="0" smtClean="0">
+                <a:latin typeface="Times New Roman" pitchFamily="18" charset="0"/>
+                <a:cs typeface="Times New Roman" pitchFamily="18" charset="0"/>
+              </a:rPr>
               <a:t>/</a:t>
             </a:r>
             <a:r>
-              <a:rPr lang="ru-RU" sz="3400" dirty="0" smtClean="0"/>
+              <a:rPr lang="ru-RU" sz="3400" dirty="0" smtClean="0">
+                <a:latin typeface="Times New Roman" pitchFamily="18" charset="0"/>
+                <a:cs typeface="Times New Roman" pitchFamily="18" charset="0"/>
+              </a:rPr>
               <a:t>продажи акций. </a:t>
             </a:r>
           </a:p>
@@ -5059,64 +5375,81 @@
               <a:buNone/>
             </a:pPr>
             <a:r>
-              <a:rPr lang="ru-RU" sz="3400" dirty="0"/>
+              <a:rPr lang="ru-RU" sz="3400" dirty="0">
+                <a:latin typeface="Times New Roman" pitchFamily="18" charset="0"/>
+                <a:cs typeface="Times New Roman" pitchFamily="18" charset="0"/>
+              </a:rPr>
               <a:t>	</a:t>
             </a:r>
             <a:r>
-              <a:rPr lang="ru-RU" sz="3400" dirty="0" smtClean="0"/>
+              <a:rPr lang="ru-RU" sz="3400" dirty="0" smtClean="0">
+                <a:latin typeface="Times New Roman" pitchFamily="18" charset="0"/>
+                <a:cs typeface="Times New Roman" pitchFamily="18" charset="0"/>
+              </a:rPr>
               <a:t>На данный момент существуют решения, которые позволяют предсказывать будущие значения. Среди них встроенный сервис на сайте </a:t>
             </a:r>
             <a:r>
-              <a:rPr lang="en-US" sz="3400" dirty="0" smtClean="0"/>
+              <a:rPr lang="en-US" sz="3400" dirty="0" smtClean="0">
+                <a:latin typeface="Times New Roman" pitchFamily="18" charset="0"/>
+                <a:cs typeface="Times New Roman" pitchFamily="18" charset="0"/>
+              </a:rPr>
               <a:t>Investing.com</a:t>
             </a:r>
             <a:r>
-              <a:rPr lang="ru-RU" sz="3400" dirty="0" smtClean="0"/>
+              <a:rPr lang="ru-RU" sz="3400" dirty="0" smtClean="0">
+                <a:latin typeface="Times New Roman" pitchFamily="18" charset="0"/>
+                <a:cs typeface="Times New Roman" pitchFamily="18" charset="0"/>
+              </a:rPr>
               <a:t>, который не имеет явной реализации, а ввиду этого должен быть проверен. Подобная реализация существует на сайте </a:t>
             </a:r>
             <a:r>
-              <a:rPr lang="en-US" sz="3400" dirty="0" smtClean="0"/>
+              <a:rPr lang="en-US" sz="3400" dirty="0" smtClean="0">
+                <a:latin typeface="Times New Roman" pitchFamily="18" charset="0"/>
+                <a:cs typeface="Times New Roman" pitchFamily="18" charset="0"/>
+              </a:rPr>
               <a:t>dohod.ru</a:t>
             </a:r>
             <a:r>
-              <a:rPr lang="ru-RU" sz="3400" dirty="0" smtClean="0"/>
+              <a:rPr lang="ru-RU" sz="3400" dirty="0" smtClean="0">
+                <a:latin typeface="Times New Roman" pitchFamily="18" charset="0"/>
+                <a:cs typeface="Times New Roman" pitchFamily="18" charset="0"/>
+              </a:rPr>
               <a:t>, но интерфейс не дружелюбен для пользователя, а открытость реализации оставляет желать лучшего.</a:t>
             </a:r>
-            <a:endParaRPr lang="ru-RU" sz="3400" dirty="0" smtClean="0"/>
           </a:p>
           <a:p>
             <a:pPr marL="0" indent="0" algn="just">
               <a:buNone/>
             </a:pPr>
             <a:r>
-              <a:rPr lang="ru-RU" sz="3400" dirty="0" smtClean="0"/>
-              <a:t>	</a:t>
-            </a:r>
-            <a:r>
-              <a:rPr lang="ru-RU" sz="3400" dirty="0" smtClean="0"/>
-              <a:t>Ввиду этих обстоятельств </a:t>
-            </a:r>
-            <a:r>
-              <a:rPr lang="ru-RU" sz="3400" dirty="0" smtClean="0"/>
-              <a:t>были использованы методы анализа и прогнозирования временных рядов и процесс был автоматизирован</a:t>
-            </a:r>
-            <a:r>
-              <a:rPr lang="ru-RU" sz="3400" dirty="0" smtClean="0"/>
-              <a:t>.</a:t>
-            </a:r>
-            <a:endParaRPr lang="en-US" sz="1800" dirty="0"/>
+              <a:rPr lang="ru-RU" sz="3400" dirty="0" smtClean="0">
+                <a:latin typeface="Times New Roman" pitchFamily="18" charset="0"/>
+                <a:cs typeface="Times New Roman" pitchFamily="18" charset="0"/>
+              </a:rPr>
+              <a:t>	Ввиду этих обстоятельств были использованы методы анализа и прогнозирования временных рядов и процесс был автоматизирован.</a:t>
+            </a:r>
+            <a:endParaRPr lang="en-US" sz="1800" dirty="0">
+              <a:latin typeface="Times New Roman" pitchFamily="18" charset="0"/>
+              <a:cs typeface="Times New Roman" pitchFamily="18" charset="0"/>
+            </a:endParaRPr>
           </a:p>
           <a:p>
             <a:pPr marL="0" indent="0" algn="ctr">
               <a:buNone/>
             </a:pPr>
-            <a:endParaRPr lang="en-US" sz="1800" dirty="0"/>
+            <a:endParaRPr lang="en-US" sz="1800" dirty="0">
+              <a:latin typeface="Times New Roman" pitchFamily="18" charset="0"/>
+              <a:cs typeface="Times New Roman" pitchFamily="18" charset="0"/>
+            </a:endParaRPr>
           </a:p>
           <a:p>
             <a:pPr marL="0" indent="0" algn="ctr">
               <a:buNone/>
             </a:pPr>
-            <a:endParaRPr lang="ru-RU" sz="3400" dirty="0"/>
+            <a:endParaRPr lang="ru-RU" sz="3400" dirty="0">
+              <a:latin typeface="Times New Roman" pitchFamily="18" charset="0"/>
+              <a:cs typeface="Times New Roman" pitchFamily="18" charset="0"/>
+            </a:endParaRPr>
           </a:p>
         </p:txBody>
       </p:sp>
@@ -5189,10 +5522,27 @@
           <a:lstStyle/>
           <a:p>
             <a:r>
+              <a:rPr lang="ru-RU" dirty="0" smtClean="0">
+                <a:latin typeface="Times New Roman" pitchFamily="18" charset="0"/>
+                <a:cs typeface="Times New Roman" pitchFamily="18" charset="0"/>
+              </a:rPr>
+              <a:t>Аналитическое</a:t>
+            </a:r>
+            <a:r>
               <a:rPr lang="ru-RU" dirty="0" smtClean="0"/>
-              <a:t>Аналитическое приложение</a:t>
-            </a:r>
-            <a:endParaRPr lang="ru-RU" dirty="0"/>
+              <a:t> </a:t>
+            </a:r>
+            <a:r>
+              <a:rPr lang="ru-RU" dirty="0" smtClean="0">
+                <a:latin typeface="Times New Roman" pitchFamily="18" charset="0"/>
+                <a:cs typeface="Times New Roman" pitchFamily="18" charset="0"/>
+              </a:rPr>
+              <a:t>приложение</a:t>
+            </a:r>
+            <a:endParaRPr lang="ru-RU" dirty="0">
+              <a:latin typeface="Times New Roman" pitchFamily="18" charset="0"/>
+              <a:cs typeface="Times New Roman" pitchFamily="18" charset="0"/>
+            </a:endParaRPr>
           </a:p>
         </p:txBody>
       </p:sp>
@@ -5222,7 +5572,10 @@
               <a:buNone/>
             </a:pPr>
             <a:r>
-              <a:rPr lang="ru-RU" dirty="0" smtClean="0"/>
+              <a:rPr lang="ru-RU" dirty="0" smtClean="0">
+                <a:latin typeface="Times New Roman" pitchFamily="18" charset="0"/>
+                <a:cs typeface="Times New Roman" pitchFamily="18" charset="0"/>
+              </a:rPr>
               <a:t>	Было построено приложение, способное в автономном режиме собирать данные о состоянии торговой площадки и текущей цены на акцию.</a:t>
             </a:r>
           </a:p>
@@ -5231,7 +5584,10 @@
               <a:buNone/>
             </a:pPr>
             <a:r>
-              <a:rPr lang="ru-RU" dirty="0" smtClean="0"/>
+              <a:rPr lang="ru-RU" dirty="0" smtClean="0">
+                <a:latin typeface="Times New Roman" pitchFamily="18" charset="0"/>
+                <a:cs typeface="Times New Roman" pitchFamily="18" charset="0"/>
+              </a:rPr>
               <a:t>	После сбора данные возможно выполнить анализ и прогноз будущих значений.</a:t>
             </a:r>
           </a:p>
@@ -5240,30 +5596,34 @@
               <a:buNone/>
             </a:pPr>
             <a:r>
-              <a:rPr lang="ru-RU" dirty="0" smtClean="0"/>
-              <a:t>	Результаты </a:t>
-            </a:r>
-            <a:r>
-              <a:rPr lang="ru-RU" dirty="0" smtClean="0"/>
-              <a:t>анализа и прогноза отображаются в приложении на графике</a:t>
-            </a:r>
-            <a:r>
-              <a:rPr lang="ru-RU" dirty="0" smtClean="0"/>
-              <a:t>.</a:t>
-            </a:r>
-            <a:endParaRPr lang="en-US" dirty="0" smtClean="0"/>
+              <a:rPr lang="ru-RU" dirty="0" smtClean="0">
+                <a:latin typeface="Times New Roman" pitchFamily="18" charset="0"/>
+                <a:cs typeface="Times New Roman" pitchFamily="18" charset="0"/>
+              </a:rPr>
+              <a:t>	Результаты анализа и прогноза отображаются в приложении на графике.</a:t>
+            </a:r>
+            <a:endParaRPr lang="en-US" dirty="0" smtClean="0">
+              <a:latin typeface="Times New Roman" pitchFamily="18" charset="0"/>
+              <a:cs typeface="Times New Roman" pitchFamily="18" charset="0"/>
+            </a:endParaRPr>
           </a:p>
           <a:p>
             <a:pPr marL="0" indent="0" algn="just">
               <a:buNone/>
             </a:pPr>
-            <a:endParaRPr lang="en-US" dirty="0"/>
+            <a:endParaRPr lang="en-US" dirty="0">
+              <a:latin typeface="Times New Roman" pitchFamily="18" charset="0"/>
+              <a:cs typeface="Times New Roman" pitchFamily="18" charset="0"/>
+            </a:endParaRPr>
           </a:p>
           <a:p>
             <a:pPr marL="0" indent="0" algn="ctr">
               <a:buNone/>
             </a:pPr>
-            <a:endParaRPr lang="ru-RU" sz="2800" dirty="0" smtClean="0"/>
+            <a:endParaRPr lang="ru-RU" sz="2800" dirty="0" smtClean="0">
+              <a:latin typeface="Times New Roman" pitchFamily="18" charset="0"/>
+              <a:cs typeface="Times New Roman" pitchFamily="18" charset="0"/>
+            </a:endParaRPr>
           </a:p>
         </p:txBody>
       </p:sp>
@@ -5336,10 +5696,16 @@
           <a:lstStyle/>
           <a:p>
             <a:r>
-              <a:rPr lang="ru-RU" dirty="0" smtClean="0"/>
+              <a:rPr lang="ru-RU" dirty="0" smtClean="0">
+                <a:latin typeface="Times New Roman" pitchFamily="18" charset="0"/>
+                <a:cs typeface="Times New Roman" pitchFamily="18" charset="0"/>
+              </a:rPr>
               <a:t>Структура приложения</a:t>
             </a:r>
-            <a:endParaRPr lang="ru-RU" dirty="0"/>
+            <a:endParaRPr lang="ru-RU" dirty="0">
+              <a:latin typeface="Times New Roman" pitchFamily="18" charset="0"/>
+              <a:cs typeface="Times New Roman" pitchFamily="18" charset="0"/>
+            </a:endParaRPr>
           </a:p>
         </p:txBody>
       </p:sp>
@@ -5369,15 +5735,24 @@
               <a:buNone/>
             </a:pPr>
             <a:r>
-              <a:rPr lang="ru-RU" dirty="0" smtClean="0"/>
+              <a:rPr lang="ru-RU" dirty="0" smtClean="0">
+                <a:latin typeface="Times New Roman" pitchFamily="18" charset="0"/>
+                <a:cs typeface="Times New Roman" pitchFamily="18" charset="0"/>
+              </a:rPr>
               <a:t>	Приложение реализовано с использованием технологии </a:t>
             </a:r>
             <a:r>
-              <a:rPr lang="en-US" dirty="0" err="1" smtClean="0"/>
+              <a:rPr lang="en-US" dirty="0" err="1" smtClean="0">
+                <a:latin typeface="Times New Roman" pitchFamily="18" charset="0"/>
+                <a:cs typeface="Times New Roman" pitchFamily="18" charset="0"/>
+              </a:rPr>
               <a:t>WinForms</a:t>
             </a:r>
             <a:r>
-              <a:rPr lang="ru-RU" dirty="0" smtClean="0"/>
+              <a:rPr lang="ru-RU" dirty="0" smtClean="0">
+                <a:latin typeface="Times New Roman" pitchFamily="18" charset="0"/>
+                <a:cs typeface="Times New Roman" pitchFamily="18" charset="0"/>
+              </a:rPr>
               <a:t>. </a:t>
             </a:r>
           </a:p>
@@ -5386,7 +5761,10 @@
               <a:buNone/>
             </a:pPr>
             <a:r>
-              <a:rPr lang="ru-RU" dirty="0" smtClean="0"/>
+              <a:rPr lang="ru-RU" dirty="0" smtClean="0">
+                <a:latin typeface="Times New Roman" pitchFamily="18" charset="0"/>
+                <a:cs typeface="Times New Roman" pitchFamily="18" charset="0"/>
+              </a:rPr>
               <a:t>	Внутренние сущности описаны и организованы в соответствии с принципами модульной разработки и ООП.</a:t>
             </a:r>
           </a:p>
@@ -5395,26 +5773,34 @@
               <a:buNone/>
             </a:pPr>
             <a:r>
-              <a:rPr lang="ru-RU" dirty="0" smtClean="0"/>
-              <a:t>	Для написания основной нагрузки приложения – анализа был взят за основу паттерн проектирования «фабричный метод</a:t>
-            </a:r>
-            <a:r>
-              <a:rPr lang="ru-RU" dirty="0" smtClean="0"/>
-              <a:t>».</a:t>
-            </a:r>
-            <a:endParaRPr lang="en-US" dirty="0" smtClean="0"/>
+              <a:rPr lang="ru-RU" dirty="0" smtClean="0">
+                <a:latin typeface="Times New Roman" pitchFamily="18" charset="0"/>
+                <a:cs typeface="Times New Roman" pitchFamily="18" charset="0"/>
+              </a:rPr>
+              <a:t>	Для написания основной нагрузки приложения – анализа был взят за основу паттерн проектирования «фабричный метод».</a:t>
+            </a:r>
+            <a:endParaRPr lang="en-US" dirty="0" smtClean="0">
+              <a:latin typeface="Times New Roman" pitchFamily="18" charset="0"/>
+              <a:cs typeface="Times New Roman" pitchFamily="18" charset="0"/>
+            </a:endParaRPr>
           </a:p>
           <a:p>
             <a:pPr marL="0" indent="0" algn="just">
               <a:buNone/>
             </a:pPr>
-            <a:endParaRPr lang="en-US" dirty="0"/>
+            <a:endParaRPr lang="en-US" dirty="0">
+              <a:latin typeface="Times New Roman" pitchFamily="18" charset="0"/>
+              <a:cs typeface="Times New Roman" pitchFamily="18" charset="0"/>
+            </a:endParaRPr>
           </a:p>
           <a:p>
             <a:pPr marL="0" indent="0" algn="ctr">
               <a:buNone/>
             </a:pPr>
-            <a:endParaRPr lang="ru-RU" sz="1800" dirty="0"/>
+            <a:endParaRPr lang="ru-RU" sz="1800" dirty="0">
+              <a:latin typeface="Times New Roman" pitchFamily="18" charset="0"/>
+              <a:cs typeface="Times New Roman" pitchFamily="18" charset="0"/>
+            </a:endParaRPr>
           </a:p>
         </p:txBody>
       </p:sp>
@@ -5487,10 +5873,16 @@
           <a:lstStyle/>
           <a:p>
             <a:r>
-              <a:rPr lang="ru-RU" dirty="0" smtClean="0"/>
+              <a:rPr lang="ru-RU" dirty="0" smtClean="0">
+                <a:latin typeface="Times New Roman" pitchFamily="18" charset="0"/>
+                <a:cs typeface="Times New Roman" pitchFamily="18" charset="0"/>
+              </a:rPr>
               <a:t>Блок-схема работы приложения</a:t>
             </a:r>
-            <a:endParaRPr lang="ru-RU" dirty="0"/>
+            <a:endParaRPr lang="ru-RU" dirty="0">
+              <a:latin typeface="Times New Roman" pitchFamily="18" charset="0"/>
+              <a:cs typeface="Times New Roman" pitchFamily="18" charset="0"/>
+            </a:endParaRPr>
           </a:p>
         </p:txBody>
       </p:sp>
@@ -5592,10 +5984,16 @@
           <a:lstStyle/>
           <a:p>
             <a:r>
-              <a:rPr lang="ru-RU" dirty="0" smtClean="0"/>
+              <a:rPr lang="ru-RU" dirty="0" smtClean="0">
+                <a:latin typeface="Times New Roman" pitchFamily="18" charset="0"/>
+                <a:cs typeface="Times New Roman" pitchFamily="18" charset="0"/>
+              </a:rPr>
               <a:t>Анализ и прогнозирование</a:t>
             </a:r>
-            <a:endParaRPr lang="ru-RU" dirty="0"/>
+            <a:endParaRPr lang="ru-RU" dirty="0">
+              <a:latin typeface="Times New Roman" pitchFamily="18" charset="0"/>
+              <a:cs typeface="Times New Roman" pitchFamily="18" charset="0"/>
+            </a:endParaRPr>
           </a:p>
         </p:txBody>
       </p:sp>
@@ -5622,18 +6020,20 @@
                   <a:buNone/>
                 </a:pPr>
                 <a:r>
-                  <a:rPr lang="ru-RU" dirty="0" smtClean="0"/>
+                  <a:rPr lang="ru-RU" dirty="0" smtClean="0">
+                    <a:latin typeface="Times New Roman" pitchFamily="18" charset="0"/>
+                    <a:cs typeface="Times New Roman" pitchFamily="18" charset="0"/>
+                  </a:rPr>
                   <a:t>	Для анализа данных используются три метода статистической обработки данных:</a:t>
                 </a:r>
               </a:p>
               <a:p>
                 <a:r>
-                  <a:rPr lang="ru-RU" dirty="0" smtClean="0"/>
-                  <a:t>Простое скользящее </a:t>
-                </a:r>
-                <a:r>
-                  <a:rPr lang="ru-RU" dirty="0" smtClean="0"/>
-                  <a:t>среднее, для которого используется формула: </a:t>
+                  <a:rPr lang="ru-RU" dirty="0" smtClean="0">
+                    <a:latin typeface="Times New Roman" pitchFamily="18" charset="0"/>
+                    <a:cs typeface="Times New Roman" pitchFamily="18" charset="0"/>
+                  </a:rPr>
+                  <a:t>Простое скользящее среднее, для которого используется формула: </a:t>
                 </a:r>
               </a:p>
               <a:p>
@@ -5797,20 +6197,25 @@
                     </m:oMath>
                   </m:oMathPara>
                 </a14:m>
-                <a:endParaRPr lang="ru-RU" dirty="0" smtClean="0"/>
+                <a:endParaRPr lang="ru-RU" dirty="0" smtClean="0">
+                  <a:latin typeface="Times New Roman" pitchFamily="18" charset="0"/>
+                  <a:cs typeface="Times New Roman" pitchFamily="18" charset="0"/>
+                </a:endParaRPr>
               </a:p>
               <a:p>
                 <a:r>
-                  <a:rPr lang="ru-RU" dirty="0" err="1" smtClean="0"/>
+                  <a:rPr lang="ru-RU" dirty="0" err="1" smtClean="0">
+                    <a:latin typeface="Times New Roman" pitchFamily="18" charset="0"/>
+                    <a:cs typeface="Times New Roman" pitchFamily="18" charset="0"/>
+                  </a:rPr>
                   <a:t>Авторегрессионное</a:t>
                 </a:r>
                 <a:r>
-                  <a:rPr lang="ru-RU" dirty="0" smtClean="0"/>
-                  <a:t> скользящее </a:t>
-                </a:r>
-                <a:r>
-                  <a:rPr lang="ru-RU" dirty="0" smtClean="0"/>
-                  <a:t>среднее, вычисляемое по формуле:</a:t>
+                  <a:rPr lang="ru-RU" dirty="0" smtClean="0">
+                    <a:latin typeface="Times New Roman" pitchFamily="18" charset="0"/>
+                    <a:cs typeface="Times New Roman" pitchFamily="18" charset="0"/>
+                  </a:rPr>
+                  <a:t> скользящее среднее, вычисляемое по формуле:</a:t>
                 </a:r>
               </a:p>
               <a:p>
@@ -6097,22 +6502,27 @@
                     </m:oMath>
                   </m:oMathPara>
                 </a14:m>
-                <a:endParaRPr lang="en-US" dirty="0"/>
+                <a:endParaRPr lang="en-US" dirty="0">
+                  <a:latin typeface="Times New Roman" pitchFamily="18" charset="0"/>
+                  <a:cs typeface="Times New Roman" pitchFamily="18" charset="0"/>
+                </a:endParaRPr>
               </a:p>
               <a:p>
                 <a:pPr marL="0" indent="0">
                   <a:buNone/>
                 </a:pPr>
-                <a:endParaRPr lang="ru-RU" dirty="0" smtClean="0"/>
+                <a:endParaRPr lang="ru-RU" dirty="0" smtClean="0">
+                  <a:latin typeface="Times New Roman" pitchFamily="18" charset="0"/>
+                  <a:cs typeface="Times New Roman" pitchFamily="18" charset="0"/>
+                </a:endParaRPr>
               </a:p>
               <a:p>
                 <a:r>
-                  <a:rPr lang="ru-RU" dirty="0" smtClean="0"/>
-                  <a:t>Метод </a:t>
-                </a:r>
-                <a:r>
-                  <a:rPr lang="ru-RU" dirty="0" smtClean="0"/>
-                  <a:t>Гусеницы, реализуемый посредством алгоритма, состоящего из четырёх основных шагов:</a:t>
+                  <a:rPr lang="ru-RU" dirty="0" smtClean="0">
+                    <a:latin typeface="Times New Roman" pitchFamily="18" charset="0"/>
+                    <a:cs typeface="Times New Roman" pitchFamily="18" charset="0"/>
+                  </a:rPr>
+                  <a:t>Метод Гусеницы, реализуемый посредством алгоритма, состоящего из четырёх основных шагов:</a:t>
                 </a:r>
               </a:p>
               <a:p>
@@ -6121,7 +6531,10 @@
                   <a:buAutoNum type="arabicPeriod"/>
                 </a:pPr>
                 <a:r>
-                  <a:rPr lang="ru-RU" i="1" dirty="0"/>
+                  <a:rPr lang="ru-RU" i="1" dirty="0">
+                    <a:latin typeface="Times New Roman" pitchFamily="18" charset="0"/>
+                    <a:cs typeface="Times New Roman" pitchFamily="18" charset="0"/>
+                  </a:rPr>
                   <a:t>Развёртка одномерного ряда в многомерный (запись его в матрицу)</a:t>
                 </a:r>
               </a:p>
@@ -6131,7 +6544,10 @@
                   <a:buAutoNum type="arabicPeriod"/>
                 </a:pPr>
                 <a:r>
-                  <a:rPr lang="ru-RU" i="1" dirty="0"/>
+                  <a:rPr lang="ru-RU" i="1" dirty="0">
+                    <a:latin typeface="Times New Roman" pitchFamily="18" charset="0"/>
+                    <a:cs typeface="Times New Roman" pitchFamily="18" charset="0"/>
+                  </a:rPr>
                   <a:t>Анализ главных компонент</a:t>
                 </a:r>
               </a:p>
@@ -6141,7 +6557,10 @@
                   <a:buAutoNum type="arabicPeriod"/>
                 </a:pPr>
                 <a:r>
-                  <a:rPr lang="ru-RU" i="1" dirty="0" smtClean="0"/>
+                  <a:rPr lang="ru-RU" i="1" dirty="0" smtClean="0">
+                    <a:latin typeface="Times New Roman" pitchFamily="18" charset="0"/>
+                    <a:cs typeface="Times New Roman" pitchFamily="18" charset="0"/>
+                  </a:rPr>
                   <a:t>Отбор главных компонент</a:t>
                 </a:r>
               </a:p>
@@ -6151,43 +6570,63 @@
                   <a:buAutoNum type="arabicPeriod"/>
                 </a:pPr>
                 <a:r>
-                  <a:rPr lang="ru-RU" i="1" dirty="0"/>
+                  <a:rPr lang="ru-RU" i="1" dirty="0">
+                    <a:latin typeface="Times New Roman" pitchFamily="18" charset="0"/>
+                    <a:cs typeface="Times New Roman" pitchFamily="18" charset="0"/>
+                  </a:rPr>
                   <a:t>Восстановление </a:t>
                 </a:r>
                 <a:r>
-                  <a:rPr lang="ru-RU" i="1" dirty="0" smtClean="0"/>
+                  <a:rPr lang="ru-RU" i="1" dirty="0" smtClean="0">
+                    <a:latin typeface="Times New Roman" pitchFamily="18" charset="0"/>
+                    <a:cs typeface="Times New Roman" pitchFamily="18" charset="0"/>
+                  </a:rPr>
                   <a:t>ряда</a:t>
                 </a:r>
-                <a:endParaRPr lang="ru-RU" i="1" dirty="0"/>
+                <a:endParaRPr lang="ru-RU" i="1" dirty="0">
+                  <a:latin typeface="Times New Roman" pitchFamily="18" charset="0"/>
+                  <a:cs typeface="Times New Roman" pitchFamily="18" charset="0"/>
+                </a:endParaRPr>
               </a:p>
               <a:p>
                 <a:pPr marL="514350" indent="-514350">
                   <a:buFont typeface="+mj-lt"/>
                   <a:buAutoNum type="arabicPeriod"/>
                 </a:pPr>
-                <a:endParaRPr lang="ru-RU" dirty="0" smtClean="0"/>
+                <a:endParaRPr lang="ru-RU" dirty="0" smtClean="0">
+                  <a:latin typeface="Times New Roman" pitchFamily="18" charset="0"/>
+                  <a:cs typeface="Times New Roman" pitchFamily="18" charset="0"/>
+                </a:endParaRPr>
               </a:p>
               <a:p>
                 <a:pPr marL="0" indent="0" algn="just">
                   <a:buNone/>
                 </a:pPr>
                 <a:r>
-                  <a:rPr lang="ru-RU" dirty="0" smtClean="0"/>
+                  <a:rPr lang="ru-RU" dirty="0" smtClean="0">
+                    <a:latin typeface="Times New Roman" pitchFamily="18" charset="0"/>
+                    <a:cs typeface="Times New Roman" pitchFamily="18" charset="0"/>
+                  </a:rPr>
                   <a:t>	Для </a:t>
                 </a:r>
                 <a:r>
-                  <a:rPr lang="ru-RU" u="sng" dirty="0" smtClean="0"/>
+                  <a:rPr lang="ru-RU" u="sng" dirty="0" smtClean="0">
+                    <a:latin typeface="Times New Roman" pitchFamily="18" charset="0"/>
+                    <a:cs typeface="Times New Roman" pitchFamily="18" charset="0"/>
+                  </a:rPr>
                   <a:t>прогноза</a:t>
                 </a:r>
                 <a:r>
-                  <a:rPr lang="ru-RU" dirty="0" smtClean="0"/>
-                  <a:t> в работе </a:t>
+                  <a:rPr lang="ru-RU" dirty="0" smtClean="0">
+                    <a:latin typeface="Times New Roman" pitchFamily="18" charset="0"/>
+                    <a:cs typeface="Times New Roman" pitchFamily="18" charset="0"/>
+                  </a:rPr>
+                  <a:t> в работе используется простое скользящее среднее в виду удобства реализации.</a:t>
                 </a:r>
-                <a:r>
-                  <a:rPr lang="ru-RU" dirty="0" smtClean="0"/>
-                  <a:t>используется простое скользящее среднее в виду удобства реализации.</a:t>
-                </a:r>
-                <a:endParaRPr lang="ru-RU" dirty="0"/>
+                <a:endParaRPr lang="ru-RU" dirty="0">
+                  <a:latin typeface="Times New Roman" pitchFamily="18" charset="0"/>
+                  <a:cs typeface="Times New Roman" pitchFamily="18" charset="0"/>
+                </a:endParaRPr>
               </a:p>
             </p:txBody>
           </p:sp>
@@ -6207,7 +6646,7 @@
               <a:blipFill rotWithShape="1">
                 <a:blip r:embed="rId2"/>
                 <a:stretch>
-                  <a:fillRect l="-296" t="-1078" r="-296"/>
+                  <a:fillRect l="-222" t="-1213" r="-296"/>
                 </a:stretch>
               </a:blipFill>
             </p:spPr>

</xml_diff>